<commit_message>
a typo corrected in week7
</commit_message>
<xml_diff>
--- a/Lectures 2023/CITS5503networking_week7.pptx
+++ b/Lectures 2023/CITS5503networking_week7.pptx
@@ -35032,7 +35032,15 @@
             <a:pPr lvl="2"/>
             <a:r>
               <a:rPr lang="en-US" sz="2400" dirty="0"/>
-              <a:t>it is used to manage IP addresses into different subnets. </a:t>
+              <a:t>it is used </a:t>
+            </a:r>
+            <a:r>
+              <a:rPr lang="en-US" sz="2400"/>
+              <a:t>to cluster </a:t>
+            </a:r>
+            <a:r>
+              <a:rPr lang="en-US" sz="2400" dirty="0"/>
+              <a:t>IP addresses into different subnets. </a:t>
             </a:r>
           </a:p>
           <a:p>

</xml_diff>